<commit_message>
Agregado Colores como variables y mejora de diagrama entidad relacion
</commit_message>
<xml_diff>
--- a/Assets/Diagrama de relacion entidad.pptx
+++ b/Assets/Diagrama de relacion entidad.pptx
@@ -243,7 +243,7 @@
           <a:p>
             <a:fld id="{A9F266C6-D667-4040-817D-5012EB45991B}" type="datetimeFigureOut">
               <a:rPr lang="es-ES" smtClean="0"/>
-              <a:t>25/09/2020</a:t>
+              <a:t>04/10/2020</a:t>
             </a:fld>
             <a:endParaRPr lang="es-ES"/>
           </a:p>
@@ -413,7 +413,7 @@
           <a:p>
             <a:fld id="{A9F266C6-D667-4040-817D-5012EB45991B}" type="datetimeFigureOut">
               <a:rPr lang="es-ES" smtClean="0"/>
-              <a:t>25/09/2020</a:t>
+              <a:t>04/10/2020</a:t>
             </a:fld>
             <a:endParaRPr lang="es-ES"/>
           </a:p>
@@ -593,7 +593,7 @@
           <a:p>
             <a:fld id="{A9F266C6-D667-4040-817D-5012EB45991B}" type="datetimeFigureOut">
               <a:rPr lang="es-ES" smtClean="0"/>
-              <a:t>25/09/2020</a:t>
+              <a:t>04/10/2020</a:t>
             </a:fld>
             <a:endParaRPr lang="es-ES"/>
           </a:p>
@@ -763,7 +763,7 @@
           <a:p>
             <a:fld id="{A9F266C6-D667-4040-817D-5012EB45991B}" type="datetimeFigureOut">
               <a:rPr lang="es-ES" smtClean="0"/>
-              <a:t>25/09/2020</a:t>
+              <a:t>04/10/2020</a:t>
             </a:fld>
             <a:endParaRPr lang="es-ES"/>
           </a:p>
@@ -1009,7 +1009,7 @@
           <a:p>
             <a:fld id="{A9F266C6-D667-4040-817D-5012EB45991B}" type="datetimeFigureOut">
               <a:rPr lang="es-ES" smtClean="0"/>
-              <a:t>25/09/2020</a:t>
+              <a:t>04/10/2020</a:t>
             </a:fld>
             <a:endParaRPr lang="es-ES"/>
           </a:p>
@@ -1241,7 +1241,7 @@
           <a:p>
             <a:fld id="{A9F266C6-D667-4040-817D-5012EB45991B}" type="datetimeFigureOut">
               <a:rPr lang="es-ES" smtClean="0"/>
-              <a:t>25/09/2020</a:t>
+              <a:t>04/10/2020</a:t>
             </a:fld>
             <a:endParaRPr lang="es-ES"/>
           </a:p>
@@ -1608,7 +1608,7 @@
           <a:p>
             <a:fld id="{A9F266C6-D667-4040-817D-5012EB45991B}" type="datetimeFigureOut">
               <a:rPr lang="es-ES" smtClean="0"/>
-              <a:t>25/09/2020</a:t>
+              <a:t>04/10/2020</a:t>
             </a:fld>
             <a:endParaRPr lang="es-ES"/>
           </a:p>
@@ -1726,7 +1726,7 @@
           <a:p>
             <a:fld id="{A9F266C6-D667-4040-817D-5012EB45991B}" type="datetimeFigureOut">
               <a:rPr lang="es-ES" smtClean="0"/>
-              <a:t>25/09/2020</a:t>
+              <a:t>04/10/2020</a:t>
             </a:fld>
             <a:endParaRPr lang="es-ES"/>
           </a:p>
@@ -1821,7 +1821,7 @@
           <a:p>
             <a:fld id="{A9F266C6-D667-4040-817D-5012EB45991B}" type="datetimeFigureOut">
               <a:rPr lang="es-ES" smtClean="0"/>
-              <a:t>25/09/2020</a:t>
+              <a:t>04/10/2020</a:t>
             </a:fld>
             <a:endParaRPr lang="es-ES"/>
           </a:p>
@@ -2098,7 +2098,7 @@
           <a:p>
             <a:fld id="{A9F266C6-D667-4040-817D-5012EB45991B}" type="datetimeFigureOut">
               <a:rPr lang="es-ES" smtClean="0"/>
-              <a:t>25/09/2020</a:t>
+              <a:t>04/10/2020</a:t>
             </a:fld>
             <a:endParaRPr lang="es-ES"/>
           </a:p>
@@ -2351,7 +2351,7 @@
           <a:p>
             <a:fld id="{A9F266C6-D667-4040-817D-5012EB45991B}" type="datetimeFigureOut">
               <a:rPr lang="es-ES" smtClean="0"/>
-              <a:t>25/09/2020</a:t>
+              <a:t>04/10/2020</a:t>
             </a:fld>
             <a:endParaRPr lang="es-ES"/>
           </a:p>
@@ -2564,7 +2564,7 @@
           <a:p>
             <a:fld id="{A9F266C6-D667-4040-817D-5012EB45991B}" type="datetimeFigureOut">
               <a:rPr lang="es-ES" smtClean="0"/>
-              <a:t>25/09/2020</a:t>
+              <a:t>04/10/2020</a:t>
             </a:fld>
             <a:endParaRPr lang="es-ES"/>
           </a:p>
@@ -3091,18 +3091,18 @@
           <a:lstStyle/>
           <a:p>
             <a:r>
-              <a:rPr lang="es-ES" sz="1200" dirty="0" err="1" smtClean="0"/>
+              <a:rPr lang="es-ES" sz="1200" u="sng" dirty="0" err="1" smtClean="0"/>
               <a:t>Id_ing</a:t>
             </a:r>
             <a:r>
-              <a:rPr lang="es-ES" sz="1200" dirty="0" smtClean="0"/>
+              <a:rPr lang="es-ES" sz="1200" u="sng" dirty="0" smtClean="0"/>
               <a:t>: </a:t>
             </a:r>
             <a:r>
-              <a:rPr lang="es-ES" sz="1200" dirty="0" err="1" smtClean="0"/>
+              <a:rPr lang="es-ES" sz="1200" u="sng" dirty="0" err="1" smtClean="0"/>
               <a:t>int</a:t>
             </a:r>
-            <a:endParaRPr lang="es-ES" sz="1200" dirty="0" smtClean="0"/>
+            <a:endParaRPr lang="es-ES" sz="1200" u="sng" dirty="0" smtClean="0"/>
           </a:p>
           <a:p>
             <a:r>
@@ -3140,7 +3140,7 @@
         <p:spPr>
           <a:xfrm>
             <a:off x="6899564" y="357343"/>
-            <a:ext cx="2194560" cy="2454381"/>
+            <a:ext cx="2194560" cy="1800013"/>
           </a:xfrm>
           <a:prstGeom prst="rect">
             <a:avLst/>
@@ -3239,7 +3239,7 @@
         <p:spPr>
           <a:xfrm>
             <a:off x="6991004" y="872733"/>
-            <a:ext cx="2003368" cy="1938992"/>
+            <a:ext cx="2003368" cy="1200329"/>
           </a:xfrm>
           <a:prstGeom prst="rect">
             <a:avLst/>
@@ -3253,8 +3253,37 @@
           <a:lstStyle/>
           <a:p>
             <a:r>
+              <a:rPr lang="es-ES" sz="1200" u="sng" dirty="0" err="1" smtClean="0"/>
+              <a:t>Id_plat</a:t>
+            </a:r>
+            <a:r>
+              <a:rPr lang="es-ES" sz="1200" u="sng" dirty="0" smtClean="0"/>
+              <a:t>: </a:t>
+            </a:r>
+            <a:r>
+              <a:rPr lang="es-ES" sz="1200" u="sng" dirty="0" err="1" smtClean="0"/>
+              <a:t>Int</a:t>
+            </a:r>
+            <a:endParaRPr lang="es-ES" sz="1200" u="sng" dirty="0" smtClean="0"/>
+          </a:p>
+          <a:p>
+            <a:r>
+              <a:rPr lang="es-ES" sz="1200" dirty="0" smtClean="0"/>
+              <a:t>Nombre: </a:t>
+            </a:r>
+            <a:r>
               <a:rPr lang="es-ES" sz="1200" dirty="0" err="1" smtClean="0"/>
-              <a:t>Id_plat</a:t>
+              <a:t>Varchar</a:t>
+            </a:r>
+            <a:r>
+              <a:rPr lang="es-ES" sz="1200" dirty="0" smtClean="0"/>
+              <a:t>(30)</a:t>
+            </a:r>
+          </a:p>
+          <a:p>
+            <a:r>
+              <a:rPr lang="es-ES" sz="1200" dirty="0" err="1" smtClean="0"/>
+              <a:t>Descripcion</a:t>
             </a:r>
             <a:r>
               <a:rPr lang="es-ES" sz="1200" dirty="0" smtClean="0"/>
@@ -3262,35 +3291,6 @@
             </a:r>
             <a:r>
               <a:rPr lang="es-ES" sz="1200" dirty="0" err="1" smtClean="0"/>
-              <a:t>Int</a:t>
-            </a:r>
-            <a:endParaRPr lang="es-ES" sz="1200" dirty="0" smtClean="0"/>
-          </a:p>
-          <a:p>
-            <a:r>
-              <a:rPr lang="es-ES" sz="1200" dirty="0" smtClean="0"/>
-              <a:t>Nombre: </a:t>
-            </a:r>
-            <a:r>
-              <a:rPr lang="es-ES" sz="1200" dirty="0" err="1" smtClean="0"/>
-              <a:t>Varchar</a:t>
-            </a:r>
-            <a:r>
-              <a:rPr lang="es-ES" sz="1200" dirty="0" smtClean="0"/>
-              <a:t>(30)</a:t>
-            </a:r>
-          </a:p>
-          <a:p>
-            <a:r>
-              <a:rPr lang="es-ES" sz="1200" dirty="0" err="1" smtClean="0"/>
-              <a:t>Descripcion</a:t>
-            </a:r>
-            <a:r>
-              <a:rPr lang="es-ES" sz="1200" dirty="0" smtClean="0"/>
-              <a:t>: </a:t>
-            </a:r>
-            <a:r>
-              <a:rPr lang="es-ES" sz="1200" dirty="0" err="1" smtClean="0"/>
               <a:t>Varchar</a:t>
             </a:r>
             <a:r>
@@ -3308,34 +3308,6 @@
               <a:t>Double</a:t>
             </a:r>
             <a:endParaRPr lang="es-ES" sz="1200" dirty="0" smtClean="0"/>
-          </a:p>
-          <a:p>
-            <a:r>
-              <a:rPr lang="es-ES" sz="1200" dirty="0" smtClean="0"/>
-              <a:t>Tiempo: </a:t>
-            </a:r>
-            <a:r>
-              <a:rPr lang="es-ES" sz="1200" dirty="0" err="1" smtClean="0"/>
-              <a:t>Enum</a:t>
-            </a:r>
-            <a:r>
-              <a:rPr lang="es-ES" sz="1200" dirty="0" smtClean="0"/>
-              <a:t>(Desayuno, Almuerzo, Cena)</a:t>
-            </a:r>
-          </a:p>
-          <a:p>
-            <a:r>
-              <a:rPr lang="es-ES" sz="1200" dirty="0" smtClean="0"/>
-              <a:t>Festividad: </a:t>
-            </a:r>
-            <a:r>
-              <a:rPr lang="es-ES" sz="1200" dirty="0" err="1" smtClean="0"/>
-              <a:t>Enum</a:t>
-            </a:r>
-            <a:r>
-              <a:rPr lang="es-ES" sz="1200" dirty="0" smtClean="0"/>
-              <a:t>(Navidad, Promocional, Halloween)</a:t>
-            </a:r>
           </a:p>
           <a:p>
             <a:r>
@@ -3468,7 +3440,7 @@
         <p:spPr>
           <a:xfrm>
             <a:off x="389313" y="813754"/>
-            <a:ext cx="2453640" cy="1785104"/>
+            <a:ext cx="2220711" cy="1615827"/>
           </a:xfrm>
           <a:prstGeom prst="rect">
             <a:avLst/>
@@ -3482,8 +3454,65 @@
           <a:lstStyle/>
           <a:p>
             <a:r>
+              <a:rPr lang="es-ES" sz="1100" u="sng" dirty="0" err="1" smtClean="0"/>
+              <a:t>Id_user</a:t>
+            </a:r>
+            <a:r>
+              <a:rPr lang="es-ES" sz="1100" u="sng" dirty="0" smtClean="0"/>
+              <a:t>: </a:t>
+            </a:r>
+            <a:r>
+              <a:rPr lang="es-ES" sz="1100" u="sng" dirty="0" err="1" smtClean="0"/>
+              <a:t>Int</a:t>
+            </a:r>
+            <a:endParaRPr lang="es-ES" sz="1100" u="sng" dirty="0" smtClean="0"/>
+          </a:p>
+          <a:p>
+            <a:r>
+              <a:rPr lang="es-ES" sz="1100" dirty="0" smtClean="0"/>
+              <a:t>Nombre: </a:t>
+            </a:r>
+            <a:r>
               <a:rPr lang="es-ES" sz="1100" dirty="0" err="1" smtClean="0"/>
-              <a:t>Id_user</a:t>
+              <a:t>Varchar</a:t>
+            </a:r>
+            <a:r>
+              <a:rPr lang="es-ES" sz="1100" dirty="0" smtClean="0"/>
+              <a:t>(30)</a:t>
+            </a:r>
+          </a:p>
+          <a:p>
+            <a:r>
+              <a:rPr lang="es-ES" sz="1100" dirty="0" smtClean="0"/>
+              <a:t>Apellido: </a:t>
+            </a:r>
+            <a:r>
+              <a:rPr lang="es-ES" sz="1100" dirty="0" err="1" smtClean="0"/>
+              <a:t>Varchar</a:t>
+            </a:r>
+            <a:r>
+              <a:rPr lang="es-ES" sz="1100" dirty="0" smtClean="0"/>
+              <a:t>(30)</a:t>
+            </a:r>
+          </a:p>
+          <a:p>
+            <a:r>
+              <a:rPr lang="es-ES" sz="1100" dirty="0" smtClean="0"/>
+              <a:t>Correo: </a:t>
+            </a:r>
+            <a:r>
+              <a:rPr lang="es-ES" sz="1100" dirty="0" err="1" smtClean="0"/>
+              <a:t>Varchar</a:t>
+            </a:r>
+            <a:r>
+              <a:rPr lang="es-ES" sz="1100" dirty="0" smtClean="0"/>
+              <a:t>(30)</a:t>
+            </a:r>
+          </a:p>
+          <a:p>
+            <a:r>
+              <a:rPr lang="es-ES" sz="1100" dirty="0" err="1" smtClean="0"/>
+              <a:t>Password</a:t>
             </a:r>
             <a:r>
               <a:rPr lang="es-ES" sz="1100" dirty="0" smtClean="0"/>
@@ -3491,14 +3520,21 @@
             </a:r>
             <a:r>
               <a:rPr lang="es-ES" sz="1100" dirty="0" err="1" smtClean="0"/>
-              <a:t>Int</a:t>
-            </a:r>
-            <a:endParaRPr lang="es-ES" sz="1100" dirty="0" smtClean="0"/>
-          </a:p>
-          <a:p>
+              <a:t>Varchar</a:t>
+            </a:r>
             <a:r>
               <a:rPr lang="es-ES" sz="1100" dirty="0" smtClean="0"/>
-              <a:t>Nombre: </a:t>
+              <a:t>(30)</a:t>
+            </a:r>
+          </a:p>
+          <a:p>
+            <a:r>
+              <a:rPr lang="es-ES" sz="1100" dirty="0" err="1" smtClean="0"/>
+              <a:t>Direccion</a:t>
+            </a:r>
+            <a:r>
+              <a:rPr lang="es-ES" sz="1100" dirty="0" smtClean="0"/>
+              <a:t>: </a:t>
             </a:r>
             <a:r>
               <a:rPr lang="es-ES" sz="1100" dirty="0" err="1" smtClean="0"/>
@@ -3506,64 +3542,13 @@
             </a:r>
             <a:r>
               <a:rPr lang="es-ES" sz="1100" dirty="0" smtClean="0"/>
-              <a:t>(30)</a:t>
-            </a:r>
-          </a:p>
-          <a:p>
-            <a:r>
-              <a:rPr lang="es-ES" sz="1100" dirty="0" smtClean="0"/>
-              <a:t>Apellido: </a:t>
-            </a:r>
+              <a:t>(100)</a:t>
+            </a:r>
+          </a:p>
+          <a:p>
             <a:r>
               <a:rPr lang="es-ES" sz="1100" dirty="0" err="1" smtClean="0"/>
-              <a:t>Varchar</a:t>
-            </a:r>
-            <a:r>
-              <a:rPr lang="es-ES" sz="1100" dirty="0" smtClean="0"/>
-              <a:t>(30)</a:t>
-            </a:r>
-          </a:p>
-          <a:p>
-            <a:r>
-              <a:rPr lang="es-ES" sz="1100" dirty="0" smtClean="0"/>
-              <a:t>Rol: </a:t>
-            </a:r>
-            <a:r>
-              <a:rPr lang="es-ES" sz="1100" dirty="0" err="1" smtClean="0"/>
-              <a:t>Enum</a:t>
-            </a:r>
-            <a:r>
-              <a:rPr lang="es-ES" sz="1100" dirty="0" smtClean="0"/>
-              <a:t>(Visitante, Empleado, </a:t>
-            </a:r>
-            <a:r>
-              <a:rPr lang="es-ES" sz="1100" dirty="0" err="1" smtClean="0"/>
-              <a:t>Admin</a:t>
-            </a:r>
-            <a:r>
-              <a:rPr lang="es-ES" sz="1100" dirty="0"/>
-              <a:t>)</a:t>
-            </a:r>
-            <a:endParaRPr lang="es-ES" sz="1100" dirty="0" smtClean="0"/>
-          </a:p>
-          <a:p>
-            <a:r>
-              <a:rPr lang="es-ES" sz="1100" dirty="0" smtClean="0"/>
-              <a:t>Correo: </a:t>
-            </a:r>
-            <a:r>
-              <a:rPr lang="es-ES" sz="1100" dirty="0" err="1" smtClean="0"/>
-              <a:t>Varchar</a:t>
-            </a:r>
-            <a:r>
-              <a:rPr lang="es-ES" sz="1100" dirty="0" smtClean="0"/>
-              <a:t>(30)</a:t>
-            </a:r>
-          </a:p>
-          <a:p>
-            <a:r>
-              <a:rPr lang="es-ES" sz="1100" dirty="0" err="1" smtClean="0"/>
-              <a:t>Password</a:t>
+              <a:t>Telefono</a:t>
             </a:r>
             <a:r>
               <a:rPr lang="es-ES" sz="1100" dirty="0" smtClean="0"/>
@@ -3571,17 +3556,17 @@
             </a:r>
             <a:r>
               <a:rPr lang="es-ES" sz="1100" dirty="0" err="1" smtClean="0"/>
-              <a:t>Varchar</a:t>
+              <a:t>int</a:t>
             </a:r>
             <a:r>
               <a:rPr lang="es-ES" sz="1100" dirty="0" smtClean="0"/>
-              <a:t>(30)</a:t>
+              <a:t>(8)</a:t>
             </a:r>
           </a:p>
           <a:p>
             <a:r>
               <a:rPr lang="es-ES" sz="1100" dirty="0" err="1" smtClean="0"/>
-              <a:t>Direccion</a:t>
+              <a:t>NumeroTarjeta</a:t>
             </a:r>
             <a:r>
               <a:rPr lang="es-ES" sz="1100" dirty="0" smtClean="0"/>
@@ -3589,42 +3574,6 @@
             </a:r>
             <a:r>
               <a:rPr lang="es-ES" sz="1100" dirty="0" err="1" smtClean="0"/>
-              <a:t>Varchar</a:t>
-            </a:r>
-            <a:r>
-              <a:rPr lang="es-ES" sz="1100" dirty="0" smtClean="0"/>
-              <a:t>(100)</a:t>
-            </a:r>
-          </a:p>
-          <a:p>
-            <a:r>
-              <a:rPr lang="es-ES" sz="1100" dirty="0" err="1" smtClean="0"/>
-              <a:t>Telefono</a:t>
-            </a:r>
-            <a:r>
-              <a:rPr lang="es-ES" sz="1100" dirty="0" smtClean="0"/>
-              <a:t>: </a:t>
-            </a:r>
-            <a:r>
-              <a:rPr lang="es-ES" sz="1100" dirty="0" err="1" smtClean="0"/>
-              <a:t>int</a:t>
-            </a:r>
-            <a:r>
-              <a:rPr lang="es-ES" sz="1100" dirty="0" smtClean="0"/>
-              <a:t>(8)</a:t>
-            </a:r>
-          </a:p>
-          <a:p>
-            <a:r>
-              <a:rPr lang="es-ES" sz="1100" dirty="0" err="1" smtClean="0"/>
-              <a:t>NumeroTarjeta</a:t>
-            </a:r>
-            <a:r>
-              <a:rPr lang="es-ES" sz="1100" dirty="0" smtClean="0"/>
-              <a:t>: </a:t>
-            </a:r>
-            <a:r>
-              <a:rPr lang="es-ES" sz="1100" dirty="0" err="1" smtClean="0"/>
               <a:t>int</a:t>
             </a:r>
             <a:r>
@@ -3634,12 +3583,8 @@
           </a:p>
           <a:p>
             <a:r>
-              <a:rPr lang="es-ES" sz="1100" smtClean="0"/>
-              <a:t>Vencimiento: </a:t>
-            </a:r>
-            <a:r>
               <a:rPr lang="es-ES" sz="1100" dirty="0" smtClean="0"/>
-              <a:t>Date</a:t>
+              <a:t>Vencimiento: Date</a:t>
             </a:r>
           </a:p>
         </p:txBody>
@@ -3805,8 +3750,8 @@
         </p:nvCxnSpPr>
         <p:spPr>
           <a:xfrm>
-            <a:off x="7996844" y="2811724"/>
-            <a:ext cx="0" cy="1290607"/>
+            <a:off x="7996844" y="2157356"/>
+            <a:ext cx="0" cy="1944975"/>
           </a:xfrm>
           <a:prstGeom prst="line">
             <a:avLst/>
@@ -3868,7 +3813,7 @@
         </p:nvSpPr>
         <p:spPr>
           <a:xfrm>
-            <a:off x="3578631" y="995636"/>
+            <a:off x="3639418" y="653166"/>
             <a:ext cx="2194560" cy="1161720"/>
           </a:xfrm>
           <a:prstGeom prst="rect">
@@ -3906,7 +3851,7 @@
         </p:nvCxnSpPr>
         <p:spPr>
           <a:xfrm>
-            <a:off x="3570319" y="1444519"/>
+            <a:off x="3631106" y="1102049"/>
             <a:ext cx="2202872" cy="0"/>
           </a:xfrm>
           <a:prstGeom prst="line">
@@ -3936,7 +3881,7 @@
         </p:nvSpPr>
         <p:spPr>
           <a:xfrm>
-            <a:off x="3670071" y="1052038"/>
+            <a:off x="3730858" y="709568"/>
             <a:ext cx="2003368" cy="369332"/>
           </a:xfrm>
           <a:prstGeom prst="rect">
@@ -3967,8 +3912,8 @@
         </p:nvSpPr>
         <p:spPr>
           <a:xfrm>
-            <a:off x="3670071" y="1511025"/>
-            <a:ext cx="2003368" cy="461665"/>
+            <a:off x="3730858" y="1168555"/>
+            <a:ext cx="2003368" cy="646331"/>
           </a:xfrm>
           <a:prstGeom prst="rect">
             <a:avLst/>
@@ -3982,8 +3927,27 @@
           <a:lstStyle/>
           <a:p>
             <a:r>
+              <a:rPr lang="es-ES" sz="1200" u="sng" dirty="0" err="1" smtClean="0"/>
+              <a:t>Id_pedido</a:t>
+            </a:r>
+            <a:r>
+              <a:rPr lang="es-ES" sz="1200" u="sng" dirty="0" smtClean="0"/>
+              <a:t>: </a:t>
+            </a:r>
+            <a:r>
+              <a:rPr lang="es-ES" sz="1200" u="sng" dirty="0" err="1" smtClean="0"/>
+              <a:t>int</a:t>
+            </a:r>
+            <a:endParaRPr lang="es-ES" sz="1200" u="sng" dirty="0" smtClean="0"/>
+          </a:p>
+          <a:p>
+            <a:r>
+              <a:rPr lang="es-ES" sz="1200" dirty="0" smtClean="0"/>
+              <a:t>*</a:t>
+            </a:r>
+            <a:r>
               <a:rPr lang="es-ES" sz="1200" dirty="0" err="1" smtClean="0"/>
-              <a:t>Id_pedido</a:t>
+              <a:t>Id_plat</a:t>
             </a:r>
             <a:r>
               <a:rPr lang="es-ES" sz="1200" dirty="0" smtClean="0"/>
@@ -4002,7 +3966,7 @@
             </a:r>
             <a:r>
               <a:rPr lang="es-ES" sz="1200" dirty="0" err="1" smtClean="0"/>
-              <a:t>Id_plat</a:t>
+              <a:t>Id_user</a:t>
             </a:r>
             <a:r>
               <a:rPr lang="es-ES" sz="1200" dirty="0" smtClean="0"/>
@@ -4024,7 +3988,7 @@
         </p:nvSpPr>
         <p:spPr>
           <a:xfrm>
-            <a:off x="3391594" y="3620395"/>
+            <a:off x="2210156" y="4384962"/>
             <a:ext cx="2552007" cy="2552007"/>
           </a:xfrm>
           <a:prstGeom prst="diamond">
@@ -4062,7 +4026,7 @@
         </p:nvCxnSpPr>
         <p:spPr>
           <a:xfrm>
-            <a:off x="4098176" y="4185661"/>
+            <a:off x="2916738" y="4950228"/>
             <a:ext cx="1147156" cy="0"/>
           </a:xfrm>
           <a:prstGeom prst="line">
@@ -4092,7 +4056,7 @@
         </p:nvSpPr>
         <p:spPr>
           <a:xfrm>
-            <a:off x="4229101" y="3930959"/>
+            <a:off x="3047663" y="4695526"/>
             <a:ext cx="876991" cy="230832"/>
           </a:xfrm>
           <a:prstGeom prst="rect">
@@ -4123,8 +4087,8 @@
         </p:nvSpPr>
         <p:spPr>
           <a:xfrm>
-            <a:off x="4146667" y="4544482"/>
-            <a:ext cx="1346662" cy="646331"/>
+            <a:off x="2888338" y="5332920"/>
+            <a:ext cx="1346662" cy="461665"/>
           </a:xfrm>
           <a:prstGeom prst="rect">
             <a:avLst/>
@@ -4138,25 +4102,14 @@
           <a:lstStyle/>
           <a:p>
             <a:r>
-              <a:rPr lang="es-ES" sz="1200" dirty="0" smtClean="0"/>
+              <a:rPr lang="es-ES" sz="1200" u="sng" dirty="0" smtClean="0"/>
               <a:t>*</a:t>
             </a:r>
             <a:r>
-              <a:rPr lang="es-ES" sz="1200" dirty="0" err="1" smtClean="0"/>
-              <a:t>id_user</a:t>
-            </a:r>
-            <a:endParaRPr lang="es-ES" sz="1200" dirty="0" smtClean="0"/>
-          </a:p>
-          <a:p>
-            <a:r>
-              <a:rPr lang="es-ES" sz="1200" dirty="0" smtClean="0"/>
-              <a:t>*</a:t>
-            </a:r>
-            <a:r>
-              <a:rPr lang="es-ES" sz="1200" dirty="0" err="1" smtClean="0"/>
+              <a:rPr lang="es-ES" sz="1200" u="sng" dirty="0" err="1" smtClean="0"/>
               <a:t>id_pedido</a:t>
             </a:r>
-            <a:endParaRPr lang="es-ES" sz="1200" dirty="0" smtClean="0"/>
+            <a:endParaRPr lang="es-ES" sz="1200" u="sng" dirty="0" smtClean="0"/>
           </a:p>
           <a:p>
             <a:r>
@@ -4175,39 +4128,6 @@
           </a:p>
         </p:txBody>
       </p:sp>
-      <p:cxnSp>
-        <p:nvCxnSpPr>
-          <p:cNvPr id="64" name="Conector recto 63"/>
-          <p:cNvCxnSpPr>
-            <a:stCxn id="58" idx="1"/>
-            <a:endCxn id="16" idx="2"/>
-          </p:cNvCxnSpPr>
-          <p:nvPr/>
-        </p:nvCxnSpPr>
-        <p:spPr>
-          <a:xfrm flipH="1" flipV="1">
-            <a:off x="1616133" y="2598858"/>
-            <a:ext cx="1775461" cy="2297541"/>
-          </a:xfrm>
-          <a:prstGeom prst="line">
-            <a:avLst/>
-          </a:prstGeom>
-        </p:spPr>
-        <p:style>
-          <a:lnRef idx="1">
-            <a:schemeClr val="dk1"/>
-          </a:lnRef>
-          <a:fillRef idx="0">
-            <a:schemeClr val="dk1"/>
-          </a:fillRef>
-          <a:effectRef idx="0">
-            <a:schemeClr val="dk1"/>
-          </a:effectRef>
-          <a:fontRef idx="minor">
-            <a:schemeClr val="tx1"/>
-          </a:fontRef>
-        </p:style>
-      </p:cxnSp>
       <p:cxnSp>
         <p:nvCxnSpPr>
           <p:cNvPr id="66" name="Conector recto 65"/>
@@ -4219,8 +4139,8 @@
         </p:nvCxnSpPr>
         <p:spPr>
           <a:xfrm flipV="1">
-            <a:off x="4667598" y="2157356"/>
-            <a:ext cx="8313" cy="1463039"/>
+            <a:off x="3486160" y="1814886"/>
+            <a:ext cx="1250538" cy="2570076"/>
           </a:xfrm>
           <a:prstGeom prst="line">
             <a:avLst/>
@@ -4252,8 +4172,8 @@
         </p:nvCxnSpPr>
         <p:spPr>
           <a:xfrm>
-            <a:off x="5773191" y="1576496"/>
-            <a:ext cx="1126373" cy="8038"/>
+            <a:off x="5833978" y="1234026"/>
+            <a:ext cx="1065586" cy="23324"/>
           </a:xfrm>
           <a:prstGeom prst="line">
             <a:avLst/>
@@ -4276,14 +4196,82 @@
       </p:cxnSp>
       <p:sp>
         <p:nvSpPr>
-          <p:cNvPr id="19" name="CuadroTexto 18"/>
+          <p:cNvPr id="41" name="Rectángulo 40"/>
+          <p:cNvSpPr/>
+          <p:nvPr/>
+        </p:nvSpPr>
+        <p:spPr>
+          <a:xfrm>
+            <a:off x="446116" y="3237704"/>
+            <a:ext cx="2194560" cy="1161720"/>
+          </a:xfrm>
+          <a:prstGeom prst="rect">
+            <a:avLst/>
+          </a:prstGeom>
+        </p:spPr>
+        <p:style>
+          <a:lnRef idx="2">
+            <a:schemeClr val="dk1"/>
+          </a:lnRef>
+          <a:fillRef idx="1">
+            <a:schemeClr val="lt1"/>
+          </a:fillRef>
+          <a:effectRef idx="0">
+            <a:schemeClr val="dk1"/>
+          </a:effectRef>
+          <a:fontRef idx="minor">
+            <a:schemeClr val="dk1"/>
+          </a:fontRef>
+        </p:style>
+        <p:txBody>
+          <a:bodyPr rtlCol="0" anchor="ctr"/>
+          <a:lstStyle/>
+          <a:p>
+            <a:pPr algn="ctr"/>
+            <a:endParaRPr lang="es-ES" dirty="0"/>
+          </a:p>
+        </p:txBody>
+      </p:sp>
+      <p:cxnSp>
+        <p:nvCxnSpPr>
+          <p:cNvPr id="42" name="Conector recto 41"/>
+          <p:cNvCxnSpPr/>
+          <p:nvPr/>
+        </p:nvCxnSpPr>
+        <p:spPr>
+          <a:xfrm>
+            <a:off x="437804" y="3686587"/>
+            <a:ext cx="2202872" cy="0"/>
+          </a:xfrm>
+          <a:prstGeom prst="line">
+            <a:avLst/>
+          </a:prstGeom>
+        </p:spPr>
+        <p:style>
+          <a:lnRef idx="1">
+            <a:schemeClr val="dk1"/>
+          </a:lnRef>
+          <a:fillRef idx="0">
+            <a:schemeClr val="dk1"/>
+          </a:fillRef>
+          <a:effectRef idx="0">
+            <a:schemeClr val="dk1"/>
+          </a:effectRef>
+          <a:fontRef idx="minor">
+            <a:schemeClr val="tx1"/>
+          </a:fontRef>
+        </p:style>
+      </p:cxnSp>
+      <p:sp>
+        <p:nvSpPr>
+          <p:cNvPr id="43" name="CuadroTexto 42"/>
           <p:cNvSpPr txBox="1"/>
           <p:nvPr/>
         </p:nvSpPr>
         <p:spPr>
           <a:xfrm>
-            <a:off x="1813906" y="2611563"/>
-            <a:ext cx="301686" cy="369332"/>
+            <a:off x="537556" y="3294106"/>
+            <a:ext cx="2003368" cy="369332"/>
           </a:xfrm>
           <a:prstGeom prst="rect">
             <a:avLst/>
@@ -4291,14 +4279,15 @@
           <a:noFill/>
         </p:spPr>
         <p:txBody>
-          <a:bodyPr wrap="none" rtlCol="0">
+          <a:bodyPr wrap="square" rtlCol="0">
             <a:spAutoFit/>
           </a:bodyPr>
           <a:lstStyle/>
           <a:p>
+            <a:pPr algn="ctr"/>
             <a:r>
               <a:rPr lang="es-ES" dirty="0" smtClean="0"/>
-              <a:t>1</a:t>
+              <a:t>Roles</a:t>
             </a:r>
             <a:endParaRPr lang="es-ES" dirty="0"/>
           </a:p>
@@ -4306,14 +4295,14 @@
       </p:sp>
       <p:sp>
         <p:nvSpPr>
-          <p:cNvPr id="20" name="CuadroTexto 19"/>
+          <p:cNvPr id="44" name="CuadroTexto 43"/>
           <p:cNvSpPr txBox="1"/>
           <p:nvPr/>
         </p:nvSpPr>
         <p:spPr>
           <a:xfrm>
-            <a:off x="3044537" y="4711732"/>
-            <a:ext cx="270166" cy="369332"/>
+            <a:off x="537556" y="3753093"/>
+            <a:ext cx="2003368" cy="646331"/>
           </a:xfrm>
           <a:prstGeom prst="rect">
             <a:avLst/>
@@ -4327,23 +4316,125 @@
           <a:lstStyle/>
           <a:p>
             <a:r>
-              <a:rPr lang="es-ES" dirty="0" smtClean="0"/>
-              <a:t>N</a:t>
-            </a:r>
+              <a:rPr lang="es-ES" sz="1200" dirty="0" smtClean="0"/>
+              <a:t>*</a:t>
+            </a:r>
+            <a:r>
+              <a:rPr lang="es-ES" sz="1200" dirty="0" err="1" smtClean="0"/>
+              <a:t>Id_user</a:t>
+            </a:r>
+            <a:r>
+              <a:rPr lang="es-ES" sz="1200" dirty="0" smtClean="0"/>
+              <a:t>: </a:t>
+            </a:r>
+            <a:r>
+              <a:rPr lang="es-ES" sz="1200" dirty="0" err="1" smtClean="0"/>
+              <a:t>int</a:t>
+            </a:r>
+            <a:endParaRPr lang="es-ES" sz="1200" dirty="0" smtClean="0"/>
+          </a:p>
+          <a:p>
+            <a:r>
+              <a:rPr lang="es-ES" sz="1200" dirty="0" smtClean="0"/>
+              <a:t>Rol: </a:t>
+            </a:r>
+            <a:r>
+              <a:rPr lang="es-ES" sz="1200" dirty="0" err="1" smtClean="0"/>
+              <a:t>Enum</a:t>
+            </a:r>
+            <a:r>
+              <a:rPr lang="es-ES" sz="1200" dirty="0" smtClean="0"/>
+              <a:t>(Visitante, Empleado, </a:t>
+            </a:r>
+            <a:r>
+              <a:rPr lang="es-ES" sz="1200" dirty="0" err="1" smtClean="0"/>
+              <a:t>Admin</a:t>
+            </a:r>
+            <a:r>
+              <a:rPr lang="es-ES" sz="1200" dirty="0" smtClean="0"/>
+              <a:t>)</a:t>
+            </a:r>
+          </a:p>
+        </p:txBody>
+      </p:sp>
+      <p:sp>
+        <p:nvSpPr>
+          <p:cNvPr id="46" name="Rectángulo 45"/>
+          <p:cNvSpPr/>
+          <p:nvPr/>
+        </p:nvSpPr>
+        <p:spPr>
+          <a:xfrm>
+            <a:off x="4834372" y="2722315"/>
+            <a:ext cx="2194560" cy="1161720"/>
+          </a:xfrm>
+          <a:prstGeom prst="rect">
+            <a:avLst/>
+          </a:prstGeom>
+        </p:spPr>
+        <p:style>
+          <a:lnRef idx="2">
+            <a:schemeClr val="dk1"/>
+          </a:lnRef>
+          <a:fillRef idx="1">
+            <a:schemeClr val="lt1"/>
+          </a:fillRef>
+          <a:effectRef idx="0">
+            <a:schemeClr val="dk1"/>
+          </a:effectRef>
+          <a:fontRef idx="minor">
+            <a:schemeClr val="dk1"/>
+          </a:fontRef>
+        </p:style>
+        <p:txBody>
+          <a:bodyPr rtlCol="0" anchor="ctr"/>
+          <a:lstStyle/>
+          <a:p>
+            <a:pPr algn="ctr"/>
             <a:endParaRPr lang="es-ES" dirty="0"/>
           </a:p>
         </p:txBody>
       </p:sp>
-      <p:sp>
-        <p:nvSpPr>
-          <p:cNvPr id="22" name="CuadroTexto 21"/>
+      <p:cxnSp>
+        <p:nvCxnSpPr>
+          <p:cNvPr id="47" name="Conector recto 46"/>
+          <p:cNvCxnSpPr/>
+          <p:nvPr/>
+        </p:nvCxnSpPr>
+        <p:spPr>
+          <a:xfrm>
+            <a:off x="4826060" y="3171198"/>
+            <a:ext cx="2202872" cy="0"/>
+          </a:xfrm>
+          <a:prstGeom prst="line">
+            <a:avLst/>
+          </a:prstGeom>
+        </p:spPr>
+        <p:style>
+          <a:lnRef idx="1">
+            <a:schemeClr val="dk1"/>
+          </a:lnRef>
+          <a:fillRef idx="0">
+            <a:schemeClr val="dk1"/>
+          </a:fillRef>
+          <a:effectRef idx="0">
+            <a:schemeClr val="dk1"/>
+          </a:effectRef>
+          <a:fontRef idx="minor">
+            <a:schemeClr val="tx1"/>
+          </a:fontRef>
+        </p:style>
+      </p:cxnSp>
+      <p:sp>
+        <p:nvSpPr>
+          <p:cNvPr id="48" name="CuadroTexto 47"/>
           <p:cNvSpPr txBox="1"/>
           <p:nvPr/>
         </p:nvSpPr>
         <p:spPr>
           <a:xfrm>
-            <a:off x="4771505" y="3237704"/>
-            <a:ext cx="334587" cy="382691"/>
+            <a:off x="4925812" y="2778717"/>
+            <a:ext cx="2003368" cy="369332"/>
           </a:xfrm>
           <a:prstGeom prst="rect">
             <a:avLst/>
@@ -4356,9 +4447,10 @@
           </a:bodyPr>
           <a:lstStyle/>
           <a:p>
+            <a:pPr algn="ctr"/>
             <a:r>
               <a:rPr lang="es-ES" dirty="0" smtClean="0"/>
-              <a:t>1</a:t>
+              <a:t>Tiempo</a:t>
             </a:r>
             <a:endParaRPr lang="es-ES" dirty="0"/>
           </a:p>
@@ -4366,14 +4458,14 @@
       </p:sp>
       <p:sp>
         <p:nvSpPr>
-          <p:cNvPr id="26" name="CuadroTexto 25"/>
+          <p:cNvPr id="49" name="CuadroTexto 48"/>
           <p:cNvSpPr txBox="1"/>
           <p:nvPr/>
         </p:nvSpPr>
         <p:spPr>
           <a:xfrm>
-            <a:off x="4752802" y="2223394"/>
-            <a:ext cx="304455" cy="382845"/>
+            <a:off x="4925812" y="3237704"/>
+            <a:ext cx="2003368" cy="646331"/>
           </a:xfrm>
           <a:prstGeom prst="rect">
             <a:avLst/>
@@ -4387,23 +4479,117 @@
           <a:lstStyle/>
           <a:p>
             <a:r>
-              <a:rPr lang="es-ES" dirty="0" smtClean="0"/>
-              <a:t>1</a:t>
-            </a:r>
+              <a:rPr lang="es-ES" sz="1200" u="sng" dirty="0" smtClean="0"/>
+              <a:t>*</a:t>
+            </a:r>
+            <a:r>
+              <a:rPr lang="es-ES" sz="1200" u="sng" dirty="0" err="1" smtClean="0"/>
+              <a:t>id_plat</a:t>
+            </a:r>
+            <a:r>
+              <a:rPr lang="es-ES" sz="1200" u="sng" dirty="0" smtClean="0"/>
+              <a:t>: </a:t>
+            </a:r>
+            <a:r>
+              <a:rPr lang="es-ES" sz="1200" u="sng" dirty="0" err="1" smtClean="0"/>
+              <a:t>int</a:t>
+            </a:r>
+            <a:endParaRPr lang="es-ES" sz="1200" u="sng" dirty="0" smtClean="0"/>
+          </a:p>
+          <a:p>
+            <a:r>
+              <a:rPr lang="es-ES" sz="1200" dirty="0" smtClean="0"/>
+              <a:t>Tiempo: </a:t>
+            </a:r>
+            <a:r>
+              <a:rPr lang="es-ES" sz="1200" dirty="0" err="1" smtClean="0"/>
+              <a:t>Enum</a:t>
+            </a:r>
+            <a:r>
+              <a:rPr lang="es-ES" sz="1200" dirty="0" smtClean="0"/>
+              <a:t>(desayuno, almuerzo, cena)</a:t>
+            </a:r>
+          </a:p>
+        </p:txBody>
+      </p:sp>
+      <p:sp>
+        <p:nvSpPr>
+          <p:cNvPr id="50" name="Rectángulo 49"/>
+          <p:cNvSpPr/>
+          <p:nvPr/>
+        </p:nvSpPr>
+        <p:spPr>
+          <a:xfrm>
+            <a:off x="5227927" y="4465619"/>
+            <a:ext cx="2194560" cy="1161720"/>
+          </a:xfrm>
+          <a:prstGeom prst="rect">
+            <a:avLst/>
+          </a:prstGeom>
+        </p:spPr>
+        <p:style>
+          <a:lnRef idx="2">
+            <a:schemeClr val="dk1"/>
+          </a:lnRef>
+          <a:fillRef idx="1">
+            <a:schemeClr val="lt1"/>
+          </a:fillRef>
+          <a:effectRef idx="0">
+            <a:schemeClr val="dk1"/>
+          </a:effectRef>
+          <a:fontRef idx="minor">
+            <a:schemeClr val="dk1"/>
+          </a:fontRef>
+        </p:style>
+        <p:txBody>
+          <a:bodyPr rtlCol="0" anchor="ctr"/>
+          <a:lstStyle/>
+          <a:p>
+            <a:pPr algn="ctr"/>
             <a:endParaRPr lang="es-ES" dirty="0"/>
           </a:p>
         </p:txBody>
       </p:sp>
-      <p:sp>
-        <p:nvSpPr>
-          <p:cNvPr id="27" name="CuadroTexto 26"/>
+      <p:cxnSp>
+        <p:nvCxnSpPr>
+          <p:cNvPr id="51" name="Conector recto 50"/>
+          <p:cNvCxnSpPr/>
+          <p:nvPr/>
+        </p:nvCxnSpPr>
+        <p:spPr>
+          <a:xfrm>
+            <a:off x="5219615" y="4914502"/>
+            <a:ext cx="2202872" cy="0"/>
+          </a:xfrm>
+          <a:prstGeom prst="line">
+            <a:avLst/>
+          </a:prstGeom>
+        </p:spPr>
+        <p:style>
+          <a:lnRef idx="1">
+            <a:schemeClr val="dk1"/>
+          </a:lnRef>
+          <a:fillRef idx="0">
+            <a:schemeClr val="dk1"/>
+          </a:fillRef>
+          <a:effectRef idx="0">
+            <a:schemeClr val="dk1"/>
+          </a:effectRef>
+          <a:fontRef idx="minor">
+            <a:schemeClr val="tx1"/>
+          </a:fontRef>
+        </p:style>
+      </p:cxnSp>
+      <p:sp>
+        <p:nvSpPr>
+          <p:cNvPr id="52" name="CuadroTexto 51"/>
           <p:cNvSpPr txBox="1"/>
           <p:nvPr/>
         </p:nvSpPr>
         <p:spPr>
           <a:xfrm>
-            <a:off x="5802284" y="1633655"/>
-            <a:ext cx="259253" cy="369332"/>
+            <a:off x="5319367" y="4522021"/>
+            <a:ext cx="2003368" cy="369332"/>
           </a:xfrm>
           <a:prstGeom prst="rect">
             <a:avLst/>
@@ -4416,9 +4602,10 @@
           </a:bodyPr>
           <a:lstStyle/>
           <a:p>
+            <a:pPr algn="ctr"/>
             <a:r>
               <a:rPr lang="es-ES" dirty="0" smtClean="0"/>
-              <a:t>1</a:t>
+              <a:t>Festividad</a:t>
             </a:r>
             <a:endParaRPr lang="es-ES" dirty="0"/>
           </a:p>
@@ -4426,14 +4613,14 @@
       </p:sp>
       <p:sp>
         <p:nvSpPr>
-          <p:cNvPr id="28" name="CuadroTexto 27"/>
+          <p:cNvPr id="53" name="CuadroTexto 52"/>
           <p:cNvSpPr txBox="1"/>
           <p:nvPr/>
         </p:nvSpPr>
         <p:spPr>
           <a:xfrm>
-            <a:off x="6514584" y="1638186"/>
-            <a:ext cx="324192" cy="369332"/>
+            <a:off x="5319367" y="4981008"/>
+            <a:ext cx="2003368" cy="646331"/>
           </a:xfrm>
           <a:prstGeom prst="rect">
             <a:avLst/>
@@ -4447,133 +4634,179 @@
           <a:lstStyle/>
           <a:p>
             <a:r>
-              <a:rPr lang="es-ES" dirty="0" smtClean="0"/>
-              <a:t>N</a:t>
-            </a:r>
-            <a:endParaRPr lang="es-ES" dirty="0"/>
-          </a:p>
-        </p:txBody>
-      </p:sp>
-      <p:sp>
-        <p:nvSpPr>
-          <p:cNvPr id="29" name="CuadroTexto 28"/>
-          <p:cNvSpPr txBox="1"/>
+              <a:rPr lang="es-ES" sz="1200" u="sng" dirty="0" smtClean="0"/>
+              <a:t>*</a:t>
+            </a:r>
+            <a:r>
+              <a:rPr lang="es-ES" sz="1200" u="sng" dirty="0" err="1" smtClean="0"/>
+              <a:t>id_plat</a:t>
+            </a:r>
+            <a:r>
+              <a:rPr lang="es-ES" sz="1200" u="sng" dirty="0" smtClean="0"/>
+              <a:t>: </a:t>
+            </a:r>
+            <a:r>
+              <a:rPr lang="es-ES" sz="1200" u="sng" dirty="0" err="1" smtClean="0"/>
+              <a:t>int</a:t>
+            </a:r>
+            <a:endParaRPr lang="es-ES" sz="1200" u="sng" dirty="0" smtClean="0"/>
+          </a:p>
+          <a:p>
+            <a:r>
+              <a:rPr lang="es-ES" sz="1200" dirty="0" smtClean="0"/>
+              <a:t>Tiempo: </a:t>
+            </a:r>
+            <a:r>
+              <a:rPr lang="es-ES" sz="1200" dirty="0" err="1" smtClean="0"/>
+              <a:t>Enum</a:t>
+            </a:r>
+            <a:r>
+              <a:rPr lang="es-ES" sz="1200" dirty="0" smtClean="0"/>
+              <a:t>(</a:t>
+            </a:r>
+            <a:r>
+              <a:rPr lang="es-ES" sz="1200" dirty="0" err="1" smtClean="0"/>
+              <a:t>Null</a:t>
+            </a:r>
+            <a:r>
+              <a:rPr lang="es-ES" sz="1200" dirty="0" smtClean="0"/>
+              <a:t>, Navidad, Promocional, Halloween)</a:t>
+            </a:r>
+          </a:p>
+        </p:txBody>
+      </p:sp>
+      <p:cxnSp>
+        <p:nvCxnSpPr>
+          <p:cNvPr id="39" name="Conector recto 38"/>
+          <p:cNvCxnSpPr>
+            <a:stCxn id="54" idx="1"/>
+            <a:endCxn id="13" idx="3"/>
+          </p:cNvCxnSpPr>
           <p:nvPr/>
-        </p:nvSpPr>
-        <p:spPr>
-          <a:xfrm>
-            <a:off x="7697584" y="2826326"/>
-            <a:ext cx="332509" cy="369332"/>
-          </a:xfrm>
-          <a:prstGeom prst="rect">
+        </p:nvCxnSpPr>
+        <p:spPr>
+          <a:xfrm flipH="1">
+            <a:off x="2776450" y="1234026"/>
+            <a:ext cx="862968" cy="260752"/>
+          </a:xfrm>
+          <a:prstGeom prst="line">
             <a:avLst/>
           </a:prstGeom>
-          <a:noFill/>
-        </p:spPr>
-        <p:txBody>
-          <a:bodyPr wrap="square" rtlCol="0">
-            <a:spAutoFit/>
-          </a:bodyPr>
-          <a:lstStyle/>
-          <a:p>
-            <a:r>
-              <a:rPr lang="es-ES" dirty="0" smtClean="0"/>
-              <a:t>1</a:t>
-            </a:r>
-            <a:endParaRPr lang="es-ES" dirty="0"/>
-          </a:p>
-        </p:txBody>
-      </p:sp>
-      <p:sp>
-        <p:nvSpPr>
-          <p:cNvPr id="31" name="CuadroTexto 30"/>
-          <p:cNvSpPr txBox="1"/>
+        </p:spPr>
+        <p:style>
+          <a:lnRef idx="1">
+            <a:schemeClr val="dk1"/>
+          </a:lnRef>
+          <a:fillRef idx="0">
+            <a:schemeClr val="dk1"/>
+          </a:fillRef>
+          <a:effectRef idx="0">
+            <a:schemeClr val="dk1"/>
+          </a:effectRef>
+          <a:fontRef idx="minor">
+            <a:schemeClr val="tx1"/>
+          </a:fontRef>
+        </p:style>
+      </p:cxnSp>
+      <p:cxnSp>
+        <p:nvCxnSpPr>
+          <p:cNvPr id="62" name="Conector recto 61"/>
+          <p:cNvCxnSpPr>
+            <a:stCxn id="13" idx="2"/>
+            <a:endCxn id="41" idx="0"/>
+          </p:cNvCxnSpPr>
           <p:nvPr/>
-        </p:nvSpPr>
-        <p:spPr>
-          <a:xfrm>
-            <a:off x="7983342" y="3562962"/>
-            <a:ext cx="297176" cy="369332"/>
-          </a:xfrm>
-          <a:prstGeom prst="rect">
+        </p:nvCxnSpPr>
+        <p:spPr>
+          <a:xfrm flipH="1">
+            <a:off x="1543396" y="2598858"/>
+            <a:ext cx="22167" cy="638846"/>
+          </a:xfrm>
+          <a:prstGeom prst="line">
             <a:avLst/>
           </a:prstGeom>
-          <a:noFill/>
-        </p:spPr>
-        <p:txBody>
-          <a:bodyPr wrap="square" rtlCol="0">
-            <a:spAutoFit/>
-          </a:bodyPr>
-          <a:lstStyle/>
-          <a:p>
-            <a:r>
-              <a:rPr lang="es-ES" dirty="0" smtClean="0"/>
-              <a:t>1</a:t>
-            </a:r>
-            <a:endParaRPr lang="es-ES" dirty="0"/>
-          </a:p>
-        </p:txBody>
-      </p:sp>
-      <p:sp>
-        <p:nvSpPr>
-          <p:cNvPr id="33" name="CuadroTexto 32"/>
-          <p:cNvSpPr txBox="1"/>
+        </p:spPr>
+        <p:style>
+          <a:lnRef idx="1">
+            <a:schemeClr val="dk1"/>
+          </a:lnRef>
+          <a:fillRef idx="0">
+            <a:schemeClr val="dk1"/>
+          </a:fillRef>
+          <a:effectRef idx="0">
+            <a:schemeClr val="dk1"/>
+          </a:effectRef>
+          <a:fontRef idx="minor">
+            <a:schemeClr val="tx1"/>
+          </a:fontRef>
+        </p:style>
+      </p:cxnSp>
+      <p:cxnSp>
+        <p:nvCxnSpPr>
+          <p:cNvPr id="68" name="Conector recto 67"/>
+          <p:cNvCxnSpPr>
+            <a:stCxn id="9" idx="2"/>
+            <a:endCxn id="46" idx="3"/>
+          </p:cNvCxnSpPr>
           <p:nvPr/>
-        </p:nvSpPr>
-        <p:spPr>
-          <a:xfrm>
-            <a:off x="10595091" y="3732998"/>
-            <a:ext cx="191193" cy="369332"/>
-          </a:xfrm>
-          <a:prstGeom prst="rect">
+        </p:nvCxnSpPr>
+        <p:spPr>
+          <a:xfrm flipH="1">
+            <a:off x="7028932" y="2157356"/>
+            <a:ext cx="967912" cy="1145819"/>
+          </a:xfrm>
+          <a:prstGeom prst="line">
             <a:avLst/>
           </a:prstGeom>
-          <a:noFill/>
-        </p:spPr>
-        <p:txBody>
-          <a:bodyPr wrap="square" rtlCol="0">
-            <a:spAutoFit/>
-          </a:bodyPr>
-          <a:lstStyle/>
-          <a:p>
-            <a:r>
-              <a:rPr lang="es-ES" dirty="0" smtClean="0"/>
-              <a:t>1</a:t>
-            </a:r>
-            <a:endParaRPr lang="es-ES" dirty="0"/>
-          </a:p>
-        </p:txBody>
-      </p:sp>
-      <p:sp>
-        <p:nvSpPr>
-          <p:cNvPr id="34" name="CuadroTexto 33"/>
-          <p:cNvSpPr txBox="1"/>
+        </p:spPr>
+        <p:style>
+          <a:lnRef idx="1">
+            <a:schemeClr val="dk1"/>
+          </a:lnRef>
+          <a:fillRef idx="0">
+            <a:schemeClr val="dk1"/>
+          </a:fillRef>
+          <a:effectRef idx="0">
+            <a:schemeClr val="dk1"/>
+          </a:effectRef>
+          <a:fontRef idx="minor">
+            <a:schemeClr val="tx1"/>
+          </a:fontRef>
+        </p:style>
+      </p:cxnSp>
+      <p:cxnSp>
+        <p:nvCxnSpPr>
+          <p:cNvPr id="71" name="Conector recto 70"/>
+          <p:cNvCxnSpPr>
+            <a:stCxn id="9" idx="2"/>
+            <a:endCxn id="50" idx="3"/>
+          </p:cNvCxnSpPr>
           <p:nvPr/>
-        </p:nvSpPr>
-        <p:spPr>
-          <a:xfrm>
-            <a:off x="10265178" y="1542213"/>
-            <a:ext cx="204701" cy="370982"/>
-          </a:xfrm>
-          <a:prstGeom prst="rect">
+        </p:nvCxnSpPr>
+        <p:spPr>
+          <a:xfrm flipH="1">
+            <a:off x="7422487" y="2157356"/>
+            <a:ext cx="574357" cy="2889123"/>
+          </a:xfrm>
+          <a:prstGeom prst="line">
             <a:avLst/>
           </a:prstGeom>
-          <a:noFill/>
-        </p:spPr>
-        <p:txBody>
-          <a:bodyPr wrap="square" rtlCol="0">
-            <a:spAutoFit/>
-          </a:bodyPr>
-          <a:lstStyle/>
-          <a:p>
-            <a:r>
-              <a:rPr lang="es-ES" smtClean="0"/>
-              <a:t>N</a:t>
-            </a:r>
-            <a:endParaRPr lang="es-ES"/>
-          </a:p>
-        </p:txBody>
-      </p:sp>
+        </p:spPr>
+        <p:style>
+          <a:lnRef idx="1">
+            <a:schemeClr val="dk1"/>
+          </a:lnRef>
+          <a:fillRef idx="0">
+            <a:schemeClr val="dk1"/>
+          </a:fillRef>
+          <a:effectRef idx="0">
+            <a:schemeClr val="dk1"/>
+          </a:effectRef>
+          <a:fontRef idx="minor">
+            <a:schemeClr val="tx1"/>
+          </a:fontRef>
+        </p:style>
+      </p:cxnSp>
     </p:spTree>
     <p:extLst>
       <p:ext uri="{BB962C8B-B14F-4D97-AF65-F5344CB8AC3E}">

</xml_diff>

<commit_message>
Intento de registro y Login
</commit_message>
<xml_diff>
--- a/Assets/Diagrama de relacion entidad.pptx
+++ b/Assets/Diagrama de relacion entidad.pptx
@@ -243,7 +243,7 @@
           <a:p>
             <a:fld id="{A9F266C6-D667-4040-817D-5012EB45991B}" type="datetimeFigureOut">
               <a:rPr lang="es-ES" smtClean="0"/>
-              <a:t>04/10/2020</a:t>
+              <a:t>06/10/2020</a:t>
             </a:fld>
             <a:endParaRPr lang="es-ES"/>
           </a:p>
@@ -413,7 +413,7 @@
           <a:p>
             <a:fld id="{A9F266C6-D667-4040-817D-5012EB45991B}" type="datetimeFigureOut">
               <a:rPr lang="es-ES" smtClean="0"/>
-              <a:t>04/10/2020</a:t>
+              <a:t>06/10/2020</a:t>
             </a:fld>
             <a:endParaRPr lang="es-ES"/>
           </a:p>
@@ -593,7 +593,7 @@
           <a:p>
             <a:fld id="{A9F266C6-D667-4040-817D-5012EB45991B}" type="datetimeFigureOut">
               <a:rPr lang="es-ES" smtClean="0"/>
-              <a:t>04/10/2020</a:t>
+              <a:t>06/10/2020</a:t>
             </a:fld>
             <a:endParaRPr lang="es-ES"/>
           </a:p>
@@ -763,7 +763,7 @@
           <a:p>
             <a:fld id="{A9F266C6-D667-4040-817D-5012EB45991B}" type="datetimeFigureOut">
               <a:rPr lang="es-ES" smtClean="0"/>
-              <a:t>04/10/2020</a:t>
+              <a:t>06/10/2020</a:t>
             </a:fld>
             <a:endParaRPr lang="es-ES"/>
           </a:p>
@@ -1009,7 +1009,7 @@
           <a:p>
             <a:fld id="{A9F266C6-D667-4040-817D-5012EB45991B}" type="datetimeFigureOut">
               <a:rPr lang="es-ES" smtClean="0"/>
-              <a:t>04/10/2020</a:t>
+              <a:t>06/10/2020</a:t>
             </a:fld>
             <a:endParaRPr lang="es-ES"/>
           </a:p>
@@ -1241,7 +1241,7 @@
           <a:p>
             <a:fld id="{A9F266C6-D667-4040-817D-5012EB45991B}" type="datetimeFigureOut">
               <a:rPr lang="es-ES" smtClean="0"/>
-              <a:t>04/10/2020</a:t>
+              <a:t>06/10/2020</a:t>
             </a:fld>
             <a:endParaRPr lang="es-ES"/>
           </a:p>
@@ -1608,7 +1608,7 @@
           <a:p>
             <a:fld id="{A9F266C6-D667-4040-817D-5012EB45991B}" type="datetimeFigureOut">
               <a:rPr lang="es-ES" smtClean="0"/>
-              <a:t>04/10/2020</a:t>
+              <a:t>06/10/2020</a:t>
             </a:fld>
             <a:endParaRPr lang="es-ES"/>
           </a:p>
@@ -1726,7 +1726,7 @@
           <a:p>
             <a:fld id="{A9F266C6-D667-4040-817D-5012EB45991B}" type="datetimeFigureOut">
               <a:rPr lang="es-ES" smtClean="0"/>
-              <a:t>04/10/2020</a:t>
+              <a:t>06/10/2020</a:t>
             </a:fld>
             <a:endParaRPr lang="es-ES"/>
           </a:p>
@@ -1821,7 +1821,7 @@
           <a:p>
             <a:fld id="{A9F266C6-D667-4040-817D-5012EB45991B}" type="datetimeFigureOut">
               <a:rPr lang="es-ES" smtClean="0"/>
-              <a:t>04/10/2020</a:t>
+              <a:t>06/10/2020</a:t>
             </a:fld>
             <a:endParaRPr lang="es-ES"/>
           </a:p>
@@ -2098,7 +2098,7 @@
           <a:p>
             <a:fld id="{A9F266C6-D667-4040-817D-5012EB45991B}" type="datetimeFigureOut">
               <a:rPr lang="es-ES" smtClean="0"/>
-              <a:t>04/10/2020</a:t>
+              <a:t>06/10/2020</a:t>
             </a:fld>
             <a:endParaRPr lang="es-ES"/>
           </a:p>
@@ -2351,7 +2351,7 @@
           <a:p>
             <a:fld id="{A9F266C6-D667-4040-817D-5012EB45991B}" type="datetimeFigureOut">
               <a:rPr lang="es-ES" smtClean="0"/>
-              <a:t>04/10/2020</a:t>
+              <a:t>06/10/2020</a:t>
             </a:fld>
             <a:endParaRPr lang="es-ES"/>
           </a:p>
@@ -2564,7 +2564,7 @@
           <a:p>
             <a:fld id="{A9F266C6-D667-4040-817D-5012EB45991B}" type="datetimeFigureOut">
               <a:rPr lang="es-ES" smtClean="0"/>
-              <a:t>04/10/2020</a:t>
+              <a:t>06/10/2020</a:t>
             </a:fld>
             <a:endParaRPr lang="es-ES"/>
           </a:p>
@@ -3837,7 +3837,7 @@
         </p:nvSpPr>
         <p:spPr>
           <a:xfrm>
-            <a:off x="3639418" y="653166"/>
+            <a:off x="3649288" y="1770368"/>
             <a:ext cx="2194560" cy="1161720"/>
           </a:xfrm>
           <a:prstGeom prst="rect">
@@ -3875,7 +3875,7 @@
         </p:nvCxnSpPr>
         <p:spPr>
           <a:xfrm>
-            <a:off x="3631106" y="1102049"/>
+            <a:off x="3640976" y="2219251"/>
             <a:ext cx="2202872" cy="0"/>
           </a:xfrm>
           <a:prstGeom prst="line">
@@ -3905,7 +3905,7 @@
         </p:nvSpPr>
         <p:spPr>
           <a:xfrm>
-            <a:off x="3730858" y="709568"/>
+            <a:off x="3740728" y="1826770"/>
             <a:ext cx="2003368" cy="369332"/>
           </a:xfrm>
           <a:prstGeom prst="rect">
@@ -3936,8 +3936,8 @@
         </p:nvSpPr>
         <p:spPr>
           <a:xfrm>
-            <a:off x="3730858" y="1168555"/>
-            <a:ext cx="2003368" cy="646331"/>
+            <a:off x="3740728" y="2285757"/>
+            <a:ext cx="2003368" cy="461665"/>
           </a:xfrm>
           <a:prstGeom prst="rect">
             <a:avLst/>
@@ -3963,25 +3963,6 @@
               <a:t>int</a:t>
             </a:r>
             <a:endParaRPr lang="es-ES" sz="1200" u="sng" dirty="0" smtClean="0"/>
-          </a:p>
-          <a:p>
-            <a:r>
-              <a:rPr lang="es-ES" sz="1200" dirty="0" smtClean="0"/>
-              <a:t>*</a:t>
-            </a:r>
-            <a:r>
-              <a:rPr lang="es-ES" sz="1200" dirty="0" err="1" smtClean="0"/>
-              <a:t>Id_plat</a:t>
-            </a:r>
-            <a:r>
-              <a:rPr lang="es-ES" sz="1200" dirty="0" smtClean="0"/>
-              <a:t>: </a:t>
-            </a:r>
-            <a:r>
-              <a:rPr lang="es-ES" sz="1200" dirty="0" err="1" smtClean="0"/>
-              <a:t>int</a:t>
-            </a:r>
-            <a:endParaRPr lang="es-ES" sz="1200" dirty="0" smtClean="0"/>
           </a:p>
           <a:p>
             <a:r>
@@ -4163,8 +4144,8 @@
         </p:nvCxnSpPr>
         <p:spPr>
           <a:xfrm flipV="1">
-            <a:off x="3486160" y="1814886"/>
-            <a:ext cx="1250538" cy="2570076"/>
+            <a:off x="3486160" y="2932088"/>
+            <a:ext cx="1260408" cy="1452874"/>
           </a:xfrm>
           <a:prstGeom prst="line">
             <a:avLst/>
@@ -4195,9 +4176,9 @@
           <p:nvPr/>
         </p:nvCxnSpPr>
         <p:spPr>
-          <a:xfrm>
-            <a:off x="5833978" y="1234026"/>
-            <a:ext cx="1065586" cy="23324"/>
+          <a:xfrm flipV="1">
+            <a:off x="5843848" y="1257350"/>
+            <a:ext cx="1055716" cy="1093878"/>
           </a:xfrm>
           <a:prstGeom prst="line">
             <a:avLst/>
@@ -4389,7 +4370,7 @@
         </p:nvSpPr>
         <p:spPr>
           <a:xfrm>
-            <a:off x="4834372" y="2722315"/>
+            <a:off x="5128175" y="3158319"/>
             <a:ext cx="2194560" cy="1161720"/>
           </a:xfrm>
           <a:prstGeom prst="rect">
@@ -4427,7 +4408,7 @@
         </p:nvCxnSpPr>
         <p:spPr>
           <a:xfrm>
-            <a:off x="4826060" y="3171198"/>
+            <a:off x="5119863" y="3607202"/>
             <a:ext cx="2202872" cy="0"/>
           </a:xfrm>
           <a:prstGeom prst="line">
@@ -4457,7 +4438,7 @@
         </p:nvSpPr>
         <p:spPr>
           <a:xfrm>
-            <a:off x="4925812" y="2778717"/>
+            <a:off x="5219615" y="3214721"/>
             <a:ext cx="2003368" cy="369332"/>
           </a:xfrm>
           <a:prstGeom prst="rect">
@@ -4488,7 +4469,7 @@
         </p:nvSpPr>
         <p:spPr>
           <a:xfrm>
-            <a:off x="4925812" y="3237704"/>
+            <a:off x="5219615" y="3673708"/>
             <a:ext cx="2003368" cy="646331"/>
           </a:xfrm>
           <a:prstGeom prst="rect">
@@ -4709,9 +4690,9 @@
           <p:nvPr/>
         </p:nvCxnSpPr>
         <p:spPr>
-          <a:xfrm flipH="1">
-            <a:off x="2776450" y="1234026"/>
-            <a:ext cx="862968" cy="260752"/>
+          <a:xfrm flipH="1" flipV="1">
+            <a:off x="2776450" y="1494778"/>
+            <a:ext cx="872838" cy="856450"/>
           </a:xfrm>
           <a:prstGeom prst="line">
             <a:avLst/>
@@ -4776,8 +4757,8 @@
         </p:nvCxnSpPr>
         <p:spPr>
           <a:xfrm flipH="1">
-            <a:off x="7028932" y="2157356"/>
-            <a:ext cx="967912" cy="1145819"/>
+            <a:off x="7322735" y="2157356"/>
+            <a:ext cx="674109" cy="1581823"/>
           </a:xfrm>
           <a:prstGeom prst="line">
             <a:avLst/>
@@ -4811,6 +4792,199 @@
           <a:xfrm flipH="1">
             <a:off x="7422487" y="2157356"/>
             <a:ext cx="574357" cy="2889123"/>
+          </a:xfrm>
+          <a:prstGeom prst="line">
+            <a:avLst/>
+          </a:prstGeom>
+        </p:spPr>
+        <p:style>
+          <a:lnRef idx="1">
+            <a:schemeClr val="dk1"/>
+          </a:lnRef>
+          <a:fillRef idx="0">
+            <a:schemeClr val="dk1"/>
+          </a:fillRef>
+          <a:effectRef idx="0">
+            <a:schemeClr val="dk1"/>
+          </a:effectRef>
+          <a:fontRef idx="minor">
+            <a:schemeClr val="tx1"/>
+          </a:fontRef>
+        </p:style>
+      </p:cxnSp>
+      <p:sp>
+        <p:nvSpPr>
+          <p:cNvPr id="63" name="Rectángulo 62"/>
+          <p:cNvSpPr/>
+          <p:nvPr/>
+        </p:nvSpPr>
+        <p:spPr>
+          <a:xfrm>
+            <a:off x="4314306" y="94906"/>
+            <a:ext cx="2194560" cy="1161720"/>
+          </a:xfrm>
+          <a:prstGeom prst="rect">
+            <a:avLst/>
+          </a:prstGeom>
+        </p:spPr>
+        <p:style>
+          <a:lnRef idx="2">
+            <a:schemeClr val="dk1"/>
+          </a:lnRef>
+          <a:fillRef idx="1">
+            <a:schemeClr val="lt1"/>
+          </a:fillRef>
+          <a:effectRef idx="0">
+            <a:schemeClr val="dk1"/>
+          </a:effectRef>
+          <a:fontRef idx="minor">
+            <a:schemeClr val="dk1"/>
+          </a:fontRef>
+        </p:style>
+        <p:txBody>
+          <a:bodyPr rtlCol="0" anchor="ctr"/>
+          <a:lstStyle/>
+          <a:p>
+            <a:pPr algn="ctr"/>
+            <a:endParaRPr lang="es-ES" dirty="0"/>
+          </a:p>
+        </p:txBody>
+      </p:sp>
+      <p:cxnSp>
+        <p:nvCxnSpPr>
+          <p:cNvPr id="64" name="Conector recto 63"/>
+          <p:cNvCxnSpPr/>
+          <p:nvPr/>
+        </p:nvCxnSpPr>
+        <p:spPr>
+          <a:xfrm>
+            <a:off x="4305994" y="543789"/>
+            <a:ext cx="2202872" cy="0"/>
+          </a:xfrm>
+          <a:prstGeom prst="line">
+            <a:avLst/>
+          </a:prstGeom>
+        </p:spPr>
+        <p:style>
+          <a:lnRef idx="1">
+            <a:schemeClr val="dk1"/>
+          </a:lnRef>
+          <a:fillRef idx="0">
+            <a:schemeClr val="dk1"/>
+          </a:fillRef>
+          <a:effectRef idx="0">
+            <a:schemeClr val="dk1"/>
+          </a:effectRef>
+          <a:fontRef idx="minor">
+            <a:schemeClr val="tx1"/>
+          </a:fontRef>
+        </p:style>
+      </p:cxnSp>
+      <p:sp>
+        <p:nvSpPr>
+          <p:cNvPr id="65" name="CuadroTexto 64"/>
+          <p:cNvSpPr txBox="1"/>
+          <p:nvPr/>
+        </p:nvSpPr>
+        <p:spPr>
+          <a:xfrm>
+            <a:off x="4405746" y="151308"/>
+            <a:ext cx="2003368" cy="369332"/>
+          </a:xfrm>
+          <a:prstGeom prst="rect">
+            <a:avLst/>
+          </a:prstGeom>
+          <a:noFill/>
+        </p:spPr>
+        <p:txBody>
+          <a:bodyPr wrap="square" rtlCol="0">
+            <a:spAutoFit/>
+          </a:bodyPr>
+          <a:lstStyle/>
+          <a:p>
+            <a:pPr algn="ctr"/>
+            <a:r>
+              <a:rPr lang="en-US" dirty="0" err="1" smtClean="0"/>
+              <a:t>Pedidos_platillos</a:t>
+            </a:r>
+            <a:endParaRPr lang="es-ES" dirty="0"/>
+          </a:p>
+        </p:txBody>
+      </p:sp>
+      <p:sp>
+        <p:nvSpPr>
+          <p:cNvPr id="67" name="CuadroTexto 66"/>
+          <p:cNvSpPr txBox="1"/>
+          <p:nvPr/>
+        </p:nvSpPr>
+        <p:spPr>
+          <a:xfrm>
+            <a:off x="4405746" y="610295"/>
+            <a:ext cx="2003368" cy="461665"/>
+          </a:xfrm>
+          <a:prstGeom prst="rect">
+            <a:avLst/>
+          </a:prstGeom>
+          <a:noFill/>
+        </p:spPr>
+        <p:txBody>
+          <a:bodyPr wrap="square" rtlCol="0">
+            <a:spAutoFit/>
+          </a:bodyPr>
+          <a:lstStyle/>
+          <a:p>
+            <a:r>
+              <a:rPr lang="es-ES" sz="1200" dirty="0" smtClean="0"/>
+              <a:t>*</a:t>
+            </a:r>
+            <a:r>
+              <a:rPr lang="es-ES" sz="1200" dirty="0" err="1" smtClean="0"/>
+              <a:t>Id_pedido</a:t>
+            </a:r>
+            <a:r>
+              <a:rPr lang="es-ES" sz="1200" dirty="0" smtClean="0"/>
+              <a:t>: </a:t>
+            </a:r>
+            <a:r>
+              <a:rPr lang="es-ES" sz="1200" dirty="0" err="1" smtClean="0"/>
+              <a:t>int</a:t>
+            </a:r>
+            <a:endParaRPr lang="es-ES" sz="1200" dirty="0" smtClean="0"/>
+          </a:p>
+          <a:p>
+            <a:r>
+              <a:rPr lang="es-ES" sz="1200" dirty="0" smtClean="0"/>
+              <a:t>*</a:t>
+            </a:r>
+            <a:r>
+              <a:rPr lang="es-ES" sz="1200" dirty="0" err="1" smtClean="0"/>
+              <a:t>Id_plat</a:t>
+            </a:r>
+            <a:r>
+              <a:rPr lang="es-ES" sz="1200" dirty="0" smtClean="0"/>
+              <a:t>: </a:t>
+            </a:r>
+            <a:r>
+              <a:rPr lang="es-ES" sz="1200" dirty="0" err="1" smtClean="0"/>
+              <a:t>int</a:t>
+            </a:r>
+            <a:endParaRPr lang="es-ES" sz="1200" dirty="0" smtClean="0"/>
+          </a:p>
+        </p:txBody>
+      </p:sp>
+      <p:cxnSp>
+        <p:nvCxnSpPr>
+          <p:cNvPr id="22" name="Conector recto 21"/>
+          <p:cNvCxnSpPr>
+            <a:stCxn id="54" idx="0"/>
+            <a:endCxn id="63" idx="2"/>
+          </p:cNvCxnSpPr>
+          <p:nvPr/>
+        </p:nvCxnSpPr>
+        <p:spPr>
+          <a:xfrm flipV="1">
+            <a:off x="4746568" y="1256626"/>
+            <a:ext cx="665018" cy="513742"/>
           </a:xfrm>
           <a:prstGeom prst="line">
             <a:avLst/>

</xml_diff>